<commit_message>
Update project03 - 기능 정리 - 현태.pptx
</commit_message>
<xml_diff>
--- a/기능 정리/project03 - 기능 정리 - 현태.pptx
+++ b/기능 정리/project03 - 기능 정리 - 현태.pptx
@@ -241,7 +241,7 @@
           <a:p>
             <a:fld id="{E0C64F5E-737F-4F6B-9F15-DAA8DB3BF429}" type="datetimeFigureOut">
               <a:rPr lang="ko-KR" altLang="en-US" smtClean="0"/>
-              <a:t>2020-01-31</a:t>
+              <a:t>2020-02-03</a:t>
             </a:fld>
             <a:endParaRPr lang="ko-KR" altLang="en-US"/>
           </a:p>
@@ -411,7 +411,7 @@
           <a:p>
             <a:fld id="{E0C64F5E-737F-4F6B-9F15-DAA8DB3BF429}" type="datetimeFigureOut">
               <a:rPr lang="ko-KR" altLang="en-US" smtClean="0"/>
-              <a:t>2020-01-31</a:t>
+              <a:t>2020-02-03</a:t>
             </a:fld>
             <a:endParaRPr lang="ko-KR" altLang="en-US"/>
           </a:p>
@@ -591,7 +591,7 @@
           <a:p>
             <a:fld id="{E0C64F5E-737F-4F6B-9F15-DAA8DB3BF429}" type="datetimeFigureOut">
               <a:rPr lang="ko-KR" altLang="en-US" smtClean="0"/>
-              <a:t>2020-01-31</a:t>
+              <a:t>2020-02-03</a:t>
             </a:fld>
             <a:endParaRPr lang="ko-KR" altLang="en-US"/>
           </a:p>
@@ -761,7 +761,7 @@
           <a:p>
             <a:fld id="{E0C64F5E-737F-4F6B-9F15-DAA8DB3BF429}" type="datetimeFigureOut">
               <a:rPr lang="ko-KR" altLang="en-US" smtClean="0"/>
-              <a:t>2020-01-31</a:t>
+              <a:t>2020-02-03</a:t>
             </a:fld>
             <a:endParaRPr lang="ko-KR" altLang="en-US"/>
           </a:p>
@@ -1007,7 +1007,7 @@
           <a:p>
             <a:fld id="{E0C64F5E-737F-4F6B-9F15-DAA8DB3BF429}" type="datetimeFigureOut">
               <a:rPr lang="ko-KR" altLang="en-US" smtClean="0"/>
-              <a:t>2020-01-31</a:t>
+              <a:t>2020-02-03</a:t>
             </a:fld>
             <a:endParaRPr lang="ko-KR" altLang="en-US"/>
           </a:p>
@@ -1239,7 +1239,7 @@
           <a:p>
             <a:fld id="{E0C64F5E-737F-4F6B-9F15-DAA8DB3BF429}" type="datetimeFigureOut">
               <a:rPr lang="ko-KR" altLang="en-US" smtClean="0"/>
-              <a:t>2020-01-31</a:t>
+              <a:t>2020-02-03</a:t>
             </a:fld>
             <a:endParaRPr lang="ko-KR" altLang="en-US"/>
           </a:p>
@@ -1606,7 +1606,7 @@
           <a:p>
             <a:fld id="{E0C64F5E-737F-4F6B-9F15-DAA8DB3BF429}" type="datetimeFigureOut">
               <a:rPr lang="ko-KR" altLang="en-US" smtClean="0"/>
-              <a:t>2020-01-31</a:t>
+              <a:t>2020-02-03</a:t>
             </a:fld>
             <a:endParaRPr lang="ko-KR" altLang="en-US"/>
           </a:p>
@@ -1724,7 +1724,7 @@
           <a:p>
             <a:fld id="{E0C64F5E-737F-4F6B-9F15-DAA8DB3BF429}" type="datetimeFigureOut">
               <a:rPr lang="ko-KR" altLang="en-US" smtClean="0"/>
-              <a:t>2020-01-31</a:t>
+              <a:t>2020-02-03</a:t>
             </a:fld>
             <a:endParaRPr lang="ko-KR" altLang="en-US"/>
           </a:p>
@@ -1819,7 +1819,7 @@
           <a:p>
             <a:fld id="{E0C64F5E-737F-4F6B-9F15-DAA8DB3BF429}" type="datetimeFigureOut">
               <a:rPr lang="ko-KR" altLang="en-US" smtClean="0"/>
-              <a:t>2020-01-31</a:t>
+              <a:t>2020-02-03</a:t>
             </a:fld>
             <a:endParaRPr lang="ko-KR" altLang="en-US"/>
           </a:p>
@@ -2096,7 +2096,7 @@
           <a:p>
             <a:fld id="{E0C64F5E-737F-4F6B-9F15-DAA8DB3BF429}" type="datetimeFigureOut">
               <a:rPr lang="ko-KR" altLang="en-US" smtClean="0"/>
-              <a:t>2020-01-31</a:t>
+              <a:t>2020-02-03</a:t>
             </a:fld>
             <a:endParaRPr lang="ko-KR" altLang="en-US"/>
           </a:p>
@@ -2349,7 +2349,7 @@
           <a:p>
             <a:fld id="{E0C64F5E-737F-4F6B-9F15-DAA8DB3BF429}" type="datetimeFigureOut">
               <a:rPr lang="ko-KR" altLang="en-US" smtClean="0"/>
-              <a:t>2020-01-31</a:t>
+              <a:t>2020-02-03</a:t>
             </a:fld>
             <a:endParaRPr lang="ko-KR" altLang="en-US"/>
           </a:p>
@@ -2562,7 +2562,7 @@
           <a:p>
             <a:fld id="{E0C64F5E-737F-4F6B-9F15-DAA8DB3BF429}" type="datetimeFigureOut">
               <a:rPr lang="ko-KR" altLang="en-US" smtClean="0"/>
-              <a:t>2020-01-31</a:t>
+              <a:t>2020-02-03</a:t>
             </a:fld>
             <a:endParaRPr lang="ko-KR" altLang="en-US"/>
           </a:p>
@@ -3078,10 +3078,333 @@
         </p:nvSpPr>
         <p:spPr/>
         <p:txBody>
-          <a:bodyPr/>
-          <a:lstStyle/>
-          <a:p>
-            <a:endParaRPr lang="ko-KR" altLang="en-US"/>
+          <a:bodyPr>
+            <a:normAutofit fontScale="92500" lnSpcReduction="10000"/>
+          </a:bodyPr>
+          <a:lstStyle/>
+          <a:p>
+            <a:pPr marL="0" indent="0">
+              <a:buNone/>
+            </a:pPr>
+            <a:r>
+              <a:rPr lang="en-US" altLang="ko-KR" dirty="0" smtClean="0"/>
+              <a:t>- </a:t>
+            </a:r>
+            <a:r>
+              <a:rPr lang="ko-KR" altLang="en-US" dirty="0" smtClean="0"/>
+              <a:t>로그인 및 회원가입 </a:t>
+            </a:r>
+            <a:r>
+              <a:rPr lang="en-US" altLang="ko-KR" dirty="0" smtClean="0"/>
+              <a:t>(</a:t>
+            </a:r>
+            <a:r>
+              <a:rPr lang="ko-KR" altLang="en-US" dirty="0" err="1" smtClean="0"/>
+              <a:t>소셜</a:t>
+            </a:r>
+            <a:r>
+              <a:rPr lang="ko-KR" altLang="en-US" dirty="0" smtClean="0"/>
+              <a:t> 로그인 및 회원가입 가능</a:t>
+            </a:r>
+            <a:r>
+              <a:rPr lang="en-US" altLang="ko-KR" dirty="0" smtClean="0"/>
+              <a:t>)</a:t>
+            </a:r>
+            <a:endParaRPr lang="en-US" altLang="ko-KR" dirty="0"/>
+          </a:p>
+          <a:p>
+            <a:pPr lvl="1">
+              <a:buFontTx/>
+              <a:buChar char="-"/>
+            </a:pPr>
+            <a:r>
+              <a:rPr lang="ko-KR" altLang="en-US" dirty="0" smtClean="0"/>
+              <a:t>아이디</a:t>
+            </a:r>
+            <a:r>
+              <a:rPr lang="en-US" altLang="ko-KR" dirty="0" smtClean="0"/>
+              <a:t>, </a:t>
+            </a:r>
+            <a:r>
+              <a:rPr lang="ko-KR" altLang="en-US" dirty="0" smtClean="0"/>
+              <a:t>비밀번호</a:t>
+            </a:r>
+            <a:r>
+              <a:rPr lang="en-US" altLang="ko-KR" dirty="0" smtClean="0"/>
+              <a:t>, </a:t>
+            </a:r>
+            <a:r>
+              <a:rPr lang="ko-KR" altLang="en-US" dirty="0" smtClean="0"/>
+              <a:t>이름</a:t>
+            </a:r>
+            <a:r>
+              <a:rPr lang="en-US" altLang="ko-KR" dirty="0" smtClean="0"/>
+              <a:t>, </a:t>
+            </a:r>
+            <a:r>
+              <a:rPr lang="ko-KR" altLang="en-US" dirty="0" smtClean="0"/>
+              <a:t>전화번호</a:t>
+            </a:r>
+            <a:r>
+              <a:rPr lang="en-US" altLang="ko-KR" dirty="0" smtClean="0"/>
+              <a:t>, </a:t>
+            </a:r>
+            <a:r>
+              <a:rPr lang="ko-KR" altLang="en-US" dirty="0" smtClean="0"/>
+              <a:t>주소</a:t>
+            </a:r>
+            <a:r>
+              <a:rPr lang="en-US" altLang="ko-KR" dirty="0" smtClean="0"/>
+              <a:t>, </a:t>
+            </a:r>
+            <a:r>
+              <a:rPr lang="ko-KR" altLang="en-US" dirty="0" err="1" smtClean="0"/>
+              <a:t>이메일</a:t>
+            </a:r>
+            <a:endParaRPr lang="en-US" altLang="ko-KR" dirty="0" smtClean="0"/>
+          </a:p>
+          <a:p>
+            <a:pPr>
+              <a:buFontTx/>
+              <a:buChar char="-"/>
+            </a:pPr>
+            <a:r>
+              <a:rPr lang="ko-KR" altLang="en-US" dirty="0" err="1" smtClean="0"/>
+              <a:t>마이페이지</a:t>
+            </a:r>
+            <a:r>
+              <a:rPr lang="ko-KR" altLang="en-US" dirty="0" smtClean="0"/>
+              <a:t> </a:t>
+            </a:r>
+            <a:r>
+              <a:rPr lang="en-US" altLang="ko-KR" dirty="0" smtClean="0"/>
+              <a:t>(</a:t>
+            </a:r>
+            <a:r>
+              <a:rPr lang="ko-KR" altLang="en-US" dirty="0" err="1" smtClean="0"/>
+              <a:t>펀딩</a:t>
+            </a:r>
+            <a:r>
+              <a:rPr lang="ko-KR" altLang="en-US" dirty="0" smtClean="0"/>
+              <a:t> 한 프로젝트</a:t>
+            </a:r>
+            <a:r>
+              <a:rPr lang="en-US" altLang="ko-KR" dirty="0" smtClean="0"/>
+              <a:t>, </a:t>
+            </a:r>
+            <a:r>
+              <a:rPr lang="ko-KR" altLang="en-US" dirty="0" smtClean="0"/>
+              <a:t>제작 프로젝트</a:t>
+            </a:r>
+            <a:r>
+              <a:rPr lang="en-US" altLang="ko-KR" dirty="0" smtClean="0"/>
+              <a:t>, </a:t>
+            </a:r>
+            <a:r>
+              <a:rPr lang="ko-KR" altLang="en-US" dirty="0" smtClean="0"/>
+              <a:t>관심 프로젝트</a:t>
+            </a:r>
+            <a:r>
+              <a:rPr lang="en-US" altLang="ko-KR" dirty="0" smtClean="0"/>
+              <a:t>, </a:t>
+            </a:r>
+            <a:r>
+              <a:rPr lang="ko-KR" altLang="en-US" dirty="0" smtClean="0"/>
+              <a:t>회원정보 설정</a:t>
+            </a:r>
+            <a:r>
+              <a:rPr lang="en-US" altLang="ko-KR" dirty="0" smtClean="0"/>
+              <a:t>, </a:t>
+            </a:r>
+            <a:r>
+              <a:rPr lang="ko-KR" altLang="en-US" dirty="0" smtClean="0"/>
+              <a:t>로그아웃</a:t>
+            </a:r>
+            <a:r>
+              <a:rPr lang="en-US" altLang="ko-KR" dirty="0" smtClean="0"/>
+              <a:t>)</a:t>
+            </a:r>
+          </a:p>
+          <a:p>
+            <a:pPr>
+              <a:buFontTx/>
+              <a:buChar char="-"/>
+            </a:pPr>
+            <a:r>
+              <a:rPr lang="ko-KR" altLang="en-US" dirty="0" smtClean="0"/>
+              <a:t>프로젝트 제작</a:t>
+            </a:r>
+            <a:endParaRPr lang="en-US" altLang="ko-KR" dirty="0" smtClean="0"/>
+          </a:p>
+          <a:p>
+            <a:pPr lvl="1">
+              <a:buFontTx/>
+              <a:buChar char="-"/>
+            </a:pPr>
+            <a:r>
+              <a:rPr lang="ko-KR" altLang="en-US" dirty="0" smtClean="0"/>
+              <a:t>프로젝트 이름</a:t>
+            </a:r>
+            <a:r>
+              <a:rPr lang="en-US" altLang="ko-KR" dirty="0" smtClean="0"/>
+              <a:t>, </a:t>
+            </a:r>
+            <a:r>
+              <a:rPr lang="ko-KR" altLang="en-US" dirty="0" err="1" smtClean="0"/>
+              <a:t>펀딩</a:t>
+            </a:r>
+            <a:r>
+              <a:rPr lang="ko-KR" altLang="en-US" dirty="0" smtClean="0"/>
+              <a:t> 받을 목표 금액</a:t>
+            </a:r>
+            <a:r>
+              <a:rPr lang="en-US" altLang="ko-KR" dirty="0" smtClean="0"/>
+              <a:t>, </a:t>
+            </a:r>
+            <a:r>
+              <a:rPr lang="ko-KR" altLang="en-US" dirty="0" smtClean="0"/>
+              <a:t>프로젝트 진행 기간</a:t>
+            </a:r>
+            <a:r>
+              <a:rPr lang="en-US" altLang="ko-KR" dirty="0" smtClean="0"/>
+              <a:t>, </a:t>
+            </a:r>
+            <a:r>
+              <a:rPr lang="ko-KR" altLang="en-US" dirty="0" smtClean="0"/>
+              <a:t>프로젝트 고유 주소</a:t>
+            </a:r>
+            <a:r>
+              <a:rPr lang="en-US" altLang="ko-KR" dirty="0" smtClean="0"/>
+              <a:t>, </a:t>
+            </a:r>
+            <a:r>
+              <a:rPr lang="ko-KR" altLang="en-US" dirty="0" smtClean="0"/>
+              <a:t>프로젝트 대표 이미지</a:t>
+            </a:r>
+            <a:r>
+              <a:rPr lang="en-US" altLang="ko-KR" dirty="0" smtClean="0"/>
+              <a:t>, </a:t>
+            </a:r>
+            <a:r>
+              <a:rPr lang="ko-KR" altLang="en-US" dirty="0" smtClean="0"/>
+              <a:t>프로젝트 키워드</a:t>
+            </a:r>
+            <a:r>
+              <a:rPr lang="en-US" altLang="ko-KR" dirty="0" smtClean="0"/>
+              <a:t>, </a:t>
+            </a:r>
+            <a:r>
+              <a:rPr lang="ko-KR" altLang="en-US" dirty="0"/>
+              <a:t>프로젝트 </a:t>
+            </a:r>
+            <a:r>
+              <a:rPr lang="ko-KR" altLang="en-US" dirty="0" smtClean="0"/>
+              <a:t>세부 동영상</a:t>
+            </a:r>
+            <a:r>
+              <a:rPr lang="en-US" altLang="ko-KR" dirty="0" smtClean="0"/>
+              <a:t>, </a:t>
+            </a:r>
+            <a:r>
+              <a:rPr lang="ko-KR" altLang="en-US" dirty="0" smtClean="0"/>
+              <a:t>프로젝트 세부 이미지</a:t>
+            </a:r>
+            <a:r>
+              <a:rPr lang="en-US" altLang="ko-KR" dirty="0" smtClean="0"/>
+              <a:t>, </a:t>
+            </a:r>
+            <a:r>
+              <a:rPr lang="ko-KR" altLang="en-US" dirty="0" smtClean="0"/>
+              <a:t>프로젝트 세부 내용</a:t>
+            </a:r>
+            <a:r>
+              <a:rPr lang="en-US" altLang="ko-KR" dirty="0" smtClean="0"/>
+              <a:t>, </a:t>
+            </a:r>
+            <a:r>
+              <a:rPr lang="ko-KR" altLang="en-US" dirty="0" smtClean="0"/>
+              <a:t>환불 정책</a:t>
+            </a:r>
+            <a:r>
+              <a:rPr lang="en-US" altLang="ko-KR" dirty="0" smtClean="0"/>
+              <a:t>, </a:t>
+            </a:r>
+            <a:r>
+              <a:rPr lang="ko-KR" altLang="en-US" dirty="0" smtClean="0"/>
+              <a:t>문의 가능 전화번호</a:t>
+            </a:r>
+            <a:r>
+              <a:rPr lang="en-US" altLang="ko-KR" dirty="0" smtClean="0"/>
+              <a:t> </a:t>
+            </a:r>
+          </a:p>
+          <a:p>
+            <a:pPr>
+              <a:buFontTx/>
+              <a:buChar char="-"/>
+            </a:pPr>
+            <a:r>
+              <a:rPr lang="ko-KR" altLang="en-US" dirty="0" smtClean="0"/>
+              <a:t>프로젝트 </a:t>
+            </a:r>
+            <a:r>
+              <a:rPr lang="ko-KR" altLang="en-US" dirty="0" err="1" smtClean="0"/>
+              <a:t>펀딩</a:t>
+            </a:r>
+            <a:r>
+              <a:rPr lang="ko-KR" altLang="en-US" dirty="0" smtClean="0"/>
+              <a:t> </a:t>
+            </a:r>
+            <a:r>
+              <a:rPr lang="en-US" altLang="ko-KR" dirty="0" smtClean="0"/>
+              <a:t>(</a:t>
+            </a:r>
+            <a:r>
+              <a:rPr lang="ko-KR" altLang="en-US" dirty="0" smtClean="0"/>
+              <a:t>프로젝트 카테고리</a:t>
+            </a:r>
+            <a:r>
+              <a:rPr lang="en-US" altLang="ko-KR" dirty="0"/>
+              <a:t> </a:t>
+            </a:r>
+            <a:r>
+              <a:rPr lang="ko-KR" altLang="en-US" dirty="0" smtClean="0"/>
+              <a:t>분류</a:t>
+            </a:r>
+            <a:r>
+              <a:rPr lang="en-US" altLang="ko-KR" dirty="0" smtClean="0"/>
+              <a:t>)</a:t>
+            </a:r>
+          </a:p>
+          <a:p>
+            <a:pPr lvl="1">
+              <a:buFontTx/>
+              <a:buChar char="-"/>
+            </a:pPr>
+            <a:r>
+              <a:rPr lang="ko-KR" altLang="en-US" dirty="0" smtClean="0"/>
+              <a:t>결제 정보</a:t>
+            </a:r>
+            <a:r>
+              <a:rPr lang="en-US" altLang="ko-KR" dirty="0" smtClean="0"/>
+              <a:t>, </a:t>
+            </a:r>
+            <a:r>
+              <a:rPr lang="ko-KR" altLang="en-US" dirty="0" smtClean="0"/>
+              <a:t>배송정보</a:t>
+            </a:r>
+            <a:endParaRPr lang="en-US" altLang="ko-KR" dirty="0" smtClean="0"/>
+          </a:p>
+          <a:p>
+            <a:pPr>
+              <a:buFontTx/>
+              <a:buChar char="-"/>
+            </a:pPr>
+            <a:r>
+              <a:rPr lang="ko-KR" altLang="en-US" dirty="0" smtClean="0"/>
+              <a:t>관심 프로젝트 등록</a:t>
+            </a:r>
+            <a:endParaRPr lang="en-US" altLang="ko-KR" dirty="0" smtClean="0"/>
           </a:p>
         </p:txBody>
       </p:sp>
@@ -3153,7 +3476,97 @@
           <a:bodyPr/>
           <a:lstStyle/>
           <a:p>
-            <a:endParaRPr lang="ko-KR" altLang="en-US"/>
+            <a:r>
+              <a:rPr lang="ko-KR" altLang="en-US" dirty="0" smtClean="0"/>
+              <a:t>회원 관리 </a:t>
+            </a:r>
+            <a:r>
+              <a:rPr lang="en-US" altLang="ko-KR" dirty="0" smtClean="0"/>
+              <a:t>(</a:t>
+            </a:r>
+            <a:r>
+              <a:rPr lang="ko-KR" altLang="en-US" dirty="0" smtClean="0"/>
+              <a:t>프로젝트 제작 회원</a:t>
+            </a:r>
+            <a:r>
+              <a:rPr lang="en-US" altLang="ko-KR" dirty="0" smtClean="0"/>
+              <a:t>, </a:t>
+            </a:r>
+            <a:r>
+              <a:rPr lang="ko-KR" altLang="en-US" dirty="0" smtClean="0"/>
+              <a:t>프로젝트 투자 회원</a:t>
+            </a:r>
+            <a:r>
+              <a:rPr lang="en-US" altLang="ko-KR" dirty="0" smtClean="0"/>
+              <a:t>)</a:t>
+            </a:r>
+          </a:p>
+          <a:p>
+            <a:r>
+              <a:rPr lang="ko-KR" altLang="en-US" dirty="0" smtClean="0"/>
+              <a:t>프로젝트 관리 </a:t>
+            </a:r>
+            <a:r>
+              <a:rPr lang="en-US" altLang="ko-KR" dirty="0" smtClean="0"/>
+              <a:t>(</a:t>
+            </a:r>
+            <a:r>
+              <a:rPr lang="ko-KR" altLang="en-US" dirty="0" smtClean="0"/>
+              <a:t>카테고리 관리</a:t>
+            </a:r>
+            <a:r>
+              <a:rPr lang="en-US" altLang="ko-KR" dirty="0" smtClean="0"/>
+              <a:t>, </a:t>
+            </a:r>
+            <a:r>
+              <a:rPr lang="ko-KR" altLang="en-US" dirty="0" err="1" smtClean="0"/>
+              <a:t>금지어</a:t>
+            </a:r>
+            <a:r>
+              <a:rPr lang="ko-KR" altLang="en-US" dirty="0" smtClean="0"/>
+              <a:t> 설정</a:t>
+            </a:r>
+            <a:r>
+              <a:rPr lang="en-US" altLang="ko-KR" dirty="0" smtClean="0"/>
+              <a:t>)</a:t>
+            </a:r>
+          </a:p>
+          <a:p>
+            <a:r>
+              <a:rPr lang="ko-KR" altLang="en-US" dirty="0" smtClean="0"/>
+              <a:t>통계</a:t>
+            </a:r>
+            <a:r>
+              <a:rPr lang="en-US" altLang="ko-KR" dirty="0" smtClean="0"/>
+              <a:t>(</a:t>
+            </a:r>
+            <a:r>
+              <a:rPr lang="ko-KR" altLang="en-US" dirty="0" smtClean="0"/>
+              <a:t>핵심 키워드</a:t>
+            </a:r>
+            <a:r>
+              <a:rPr lang="en-US" altLang="ko-KR" dirty="0" smtClean="0"/>
+              <a:t>, </a:t>
+            </a:r>
+            <a:r>
+              <a:rPr lang="ko-KR" altLang="en-US" dirty="0" smtClean="0"/>
+              <a:t>프로젝트 현황</a:t>
+            </a:r>
+            <a:r>
+              <a:rPr lang="en-US" altLang="ko-KR" dirty="0" smtClean="0"/>
+              <a:t>, </a:t>
+            </a:r>
+            <a:r>
+              <a:rPr lang="ko-KR" altLang="en-US" dirty="0" smtClean="0"/>
+              <a:t>결제 정보</a:t>
+            </a:r>
+            <a:r>
+              <a:rPr lang="en-US" altLang="ko-KR" dirty="0" smtClean="0"/>
+              <a:t>)</a:t>
+            </a:r>
+          </a:p>
+          <a:p>
+            <a:endParaRPr lang="ko-KR" altLang="en-US" dirty="0"/>
           </a:p>
         </p:txBody>
       </p:sp>
@@ -3300,7 +3713,7 @@
     </a:clrScheme>
     <a:fontScheme name="Office">
       <a:majorFont>
-        <a:latin typeface="맑은 고딕" panose="020F0302020204030204"/>
+        <a:latin typeface="맑은 고딕"/>
         <a:ea typeface=""/>
         <a:cs typeface=""/>
         <a:font script="Jpan" typeface="ＭＳ Ｐゴシック"/>
@@ -3335,7 +3748,7 @@
         <a:font script="Geor" typeface="Sylfaen"/>
       </a:majorFont>
       <a:minorFont>
-        <a:latin typeface="맑은 고딕" panose="020F0502020204030204"/>
+        <a:latin typeface="맑은 고딕"/>
         <a:ea typeface=""/>
         <a:cs typeface=""/>
         <a:font script="Jpan" typeface="ＭＳ Ｐゴシック"/>
@@ -3512,7 +3925,7 @@
   <a:extraClrSchemeLst/>
   <a:extLst>
     <a:ext uri="{05A4C25C-085E-4340-85A3-A5531E510DB2}">
-      <thm15:themeFamily xmlns:thm15="http://schemas.microsoft.com/office/thememl/2012/main" name="Office Theme" id="{62F939B6-93AF-4DB8-9C6B-D6C7DFDC589F}" vid="{4A3C46E8-61CC-4603-A589-7422A47A8E4A}"/>
+      <thm15:themeFamily xmlns:thm15="http://schemas.microsoft.com/office/thememl/2012/main" xmlns="" name="Office Theme" id="{62F939B6-93AF-4DB8-9C6B-D6C7DFDC589F}" vid="{4A3C46E8-61CC-4603-A589-7422A47A8E4A}"/>
     </a:ext>
   </a:extLst>
 </a:theme>

</xml_diff>